<commit_message>
Added Links in Presentation
</commit_message>
<xml_diff>
--- a/NetLogoWeb.pptx
+++ b/NetLogoWeb.pptx
@@ -22,6 +22,7 @@
     <p:sldId id="274" r:id="rId16"/>
     <p:sldId id="275" r:id="rId17"/>
     <p:sldId id="276" r:id="rId18"/>
+    <p:sldId id="277" r:id="rId19"/>
   </p:sldIdLst>
   <p:sldSz cx="12192000" cy="6858000"/>
   <p:notesSz cx="6858000" cy="9144000"/>
@@ -5715,6 +5716,133 @@
 </p:sld>
 </file>
 
+<file path=ppt/slides/slide18.xml><?xml version="1.0" encoding="utf-8"?>
+<p:sld xmlns:a="http://schemas.openxmlformats.org/drawingml/2006/main" xmlns:r="http://schemas.openxmlformats.org/officeDocument/2006/relationships" xmlns:p="http://schemas.openxmlformats.org/presentationml/2006/main">
+  <p:cSld>
+    <p:spTree>
+      <p:nvGrpSpPr>
+        <p:cNvPr id="1" name=""/>
+        <p:cNvGrpSpPr/>
+        <p:nvPr/>
+      </p:nvGrpSpPr>
+      <p:grpSpPr>
+        <a:xfrm>
+          <a:off x="0" y="0"/>
+          <a:ext cx="0" cy="0"/>
+          <a:chOff x="0" y="0"/>
+          <a:chExt cx="0" cy="0"/>
+        </a:xfrm>
+      </p:grpSpPr>
+      <p:sp>
+        <p:nvSpPr>
+          <p:cNvPr id="2" name="Titel 1"/>
+          <p:cNvSpPr>
+            <a:spLocks noGrp="1"/>
+          </p:cNvSpPr>
+          <p:nvPr>
+            <p:ph type="title"/>
+          </p:nvPr>
+        </p:nvSpPr>
+        <p:spPr/>
+        <p:txBody>
+          <a:bodyPr/>
+          <a:lstStyle/>
+          <a:p>
+            <a:r>
+              <a:rPr lang="de-DE" dirty="0" err="1" smtClean="0"/>
+              <a:t>Two</a:t>
+            </a:r>
+            <a:r>
+              <a:rPr lang="de-DE" dirty="0" smtClean="0"/>
+              <a:t> </a:t>
+            </a:r>
+            <a:r>
+              <a:rPr lang="de-DE" dirty="0" err="1" smtClean="0"/>
+              <a:t>Examples</a:t>
+            </a:r>
+            <a:endParaRPr lang="de-DE" dirty="0"/>
+          </a:p>
+        </p:txBody>
+      </p:sp>
+      <p:sp>
+        <p:nvSpPr>
+          <p:cNvPr id="3" name="Inhaltsplatzhalter 2"/>
+          <p:cNvSpPr>
+            <a:spLocks noGrp="1"/>
+          </p:cNvSpPr>
+          <p:nvPr>
+            <p:ph sz="quarter" idx="10"/>
+          </p:nvPr>
+        </p:nvSpPr>
+        <p:spPr>
+          <a:xfrm>
+            <a:off x="874711" y="1404186"/>
+            <a:ext cx="10580688" cy="4344987"/>
+          </a:xfrm>
+        </p:spPr>
+        <p:txBody>
+          <a:bodyPr/>
+          <a:lstStyle/>
+          <a:p>
+            <a:pPr marL="285750" indent="-285750">
+              <a:buFont typeface="Arial" panose="020B0604020202020204" pitchFamily="34" charset="0"/>
+              <a:buChar char="•"/>
+            </a:pPr>
+            <a:r>
+              <a:rPr lang="de-DE" dirty="0">
+                <a:hlinkClick r:id="rId2"/>
+              </a:rPr>
+              <a:t>https://</a:t>
+            </a:r>
+            <a:r>
+              <a:rPr lang="de-DE" dirty="0" smtClean="0">
+                <a:hlinkClick r:id="rId2"/>
+              </a:rPr>
+              <a:t>jheinermann.github.io/TryNetLogoWeb/Show_NetLogoWeb.html</a:t>
+            </a:r>
+            <a:endParaRPr lang="de-DE" dirty="0" smtClean="0"/>
+          </a:p>
+          <a:p>
+            <a:pPr marL="285750" indent="-285750">
+              <a:buFont typeface="Arial" panose="020B0604020202020204" pitchFamily="34" charset="0"/>
+              <a:buChar char="•"/>
+            </a:pPr>
+            <a:r>
+              <a:rPr lang="de-DE" dirty="0">
+                <a:hlinkClick r:id="rId3"/>
+              </a:rPr>
+              <a:t>https://</a:t>
+            </a:r>
+            <a:r>
+              <a:rPr lang="de-DE" dirty="0" smtClean="0">
+                <a:hlinkClick r:id="rId3"/>
+              </a:rPr>
+              <a:t>jheinermann.github.io/TryNetLogoWeb/OneTreeShadow_ellipsoid.html</a:t>
+            </a:r>
+            <a:endParaRPr lang="de-DE" dirty="0" smtClean="0"/>
+          </a:p>
+          <a:p>
+            <a:pPr marL="285750" indent="-285750">
+              <a:buFont typeface="Arial" panose="020B0604020202020204" pitchFamily="34" charset="0"/>
+              <a:buChar char="•"/>
+            </a:pPr>
+            <a:endParaRPr lang="de-DE" dirty="0"/>
+          </a:p>
+        </p:txBody>
+      </p:sp>
+    </p:spTree>
+    <p:extLst>
+      <p:ext uri="{BB962C8B-B14F-4D97-AF65-F5344CB8AC3E}">
+        <p14:creationId xmlns:p14="http://schemas.microsoft.com/office/powerpoint/2010/main" val="1089129684"/>
+      </p:ext>
+    </p:extLst>
+  </p:cSld>
+  <p:clrMapOvr>
+    <a:masterClrMapping/>
+  </p:clrMapOvr>
+</p:sld>
+</file>
+
 <file path=ppt/slides/slide2.xml><?xml version="1.0" encoding="utf-8"?>
 <p:sld xmlns:a="http://schemas.openxmlformats.org/drawingml/2006/main" xmlns:r="http://schemas.openxmlformats.org/officeDocument/2006/relationships" xmlns:p="http://schemas.openxmlformats.org/presentationml/2006/main">
   <p:cSld>

</xml_diff>